<commit_message>
Completed test/fix of whiteboard design session (including making PPTX fully accessible), completed Before the Hands-on Lab updates
</commit_message>
<xml_diff>
--- a/Whiteboard design session/WDS trainer presentation - SAP plus extend and innovate with Data and AI.pptx
+++ b/Whiteboard design session/WDS trainer presentation - SAP plus extend and innovate with Data and AI.pptx
@@ -236,7 +236,7 @@
           <a:p>
             <a:fld id="{52A13B17-C506-4D51-BB37-16B365906619}" type="datetimeFigureOut">
               <a:rPr lang="en-US" smtClean="0"/>
-              <a:t>8/30/2022</a:t>
+              <a:t>6/2/2023</a:t>
             </a:fld>
             <a:endParaRPr lang="en-US" dirty="0"/>
           </a:p>
@@ -3781,7 +3781,7 @@
                   <a:prstClr val="black"/>
                 </a:solidFill>
               </a:rPr>
-              <a:t>8/30/2022 11:50 AM</a:t>
+              <a:t>6/2/2023 12:39 PM</a:t>
             </a:fld>
             <a:endParaRPr lang="en-US" dirty="0">
               <a:solidFill>
@@ -24995,7 +24995,7 @@
           <a:p>
             <a:r>
               <a:rPr lang="en-US" dirty="0"/>
-              <a:t>SAP plus extend and innovate with Data and AI</a:t>
+              <a:t>MCW SAP plus extend and innovate with Data and AI</a:t>
             </a:r>
           </a:p>
         </p:txBody>
@@ -26640,7 +26640,7 @@
           <a:p>
             <a:r>
               <a:rPr lang="en-US" dirty="0"/>
-              <a:t>Data ingestion and integration</a:t>
+              <a:t>Data ingestion and integration - 1</a:t>
             </a:r>
             <a:endParaRPr lang="en-IE" dirty="0"/>
           </a:p>
@@ -26755,7 +26755,7 @@
           <a:p>
             <a:r>
               <a:rPr lang="en-US" dirty="0"/>
-              <a:t>Data ingestion and integration</a:t>
+              <a:t>Data ingestion and integration - 2</a:t>
             </a:r>
           </a:p>
         </p:txBody>
@@ -26864,7 +26864,7 @@
           <a:p>
             <a:r>
               <a:rPr lang="en-US" dirty="0"/>
-              <a:t>Data ingestion and integration</a:t>
+              <a:t>Data ingestion and integration - 3</a:t>
             </a:r>
           </a:p>
         </p:txBody>
@@ -26973,7 +26973,7 @@
           <a:p>
             <a:r>
               <a:rPr lang="en-US" dirty="0"/>
-              <a:t>Data ingestion and integration</a:t>
+              <a:t>Data ingestion and integration - 4</a:t>
             </a:r>
           </a:p>
         </p:txBody>
@@ -27245,7 +27245,7 @@
           <a:p>
             <a:r>
               <a:rPr lang="en-US" dirty="0"/>
-              <a:t>Data transformation and processing</a:t>
+              <a:t>Data transformation and processing - 1</a:t>
             </a:r>
           </a:p>
         </p:txBody>
@@ -27354,7 +27354,7 @@
           <a:p>
             <a:r>
               <a:rPr lang="en-US" dirty="0"/>
-              <a:t>Data transformation and processing</a:t>
+              <a:t>Data transformation and processing - 2</a:t>
             </a:r>
           </a:p>
         </p:txBody>
@@ -27560,7 +27560,7 @@
           <a:p>
             <a:r>
               <a:rPr lang="en-US" dirty="0"/>
-              <a:t>Data analytics</a:t>
+              <a:t>Data analytics - 1</a:t>
             </a:r>
             <a:endParaRPr lang="en-IE" dirty="0"/>
           </a:p>
@@ -27702,8 +27702,8 @@
           <a:lstStyle/>
           <a:p>
             <a:r>
-              <a:rPr lang="en-US" dirty="0"/>
-              <a:t>Data analytics</a:t>
+              <a:rPr lang="en-US"/>
+              <a:t>Data analytics - 2</a:t>
             </a:r>
             <a:endParaRPr lang="en-IE" dirty="0"/>
           </a:p>
@@ -29303,6 +29303,41 @@
           <a:chExt cx="0" cy="0"/>
         </a:xfrm>
       </p:grpSpPr>
+      <p:sp>
+        <p:nvSpPr>
+          <p:cNvPr id="2" name="Title 1">
+            <a:extLst>
+              <a:ext uri="{FF2B5EF4-FFF2-40B4-BE49-F238E27FC236}">
+                <a16:creationId xmlns:a16="http://schemas.microsoft.com/office/drawing/2014/main" id="{AE990BE1-A767-6A37-F375-B517092DD1F7}"/>
+              </a:ext>
+            </a:extLst>
+          </p:cNvPr>
+          <p:cNvSpPr>
+            <a:spLocks noGrp="1"/>
+          </p:cNvSpPr>
+          <p:nvPr>
+            <p:ph type="title" idx="4294967295"/>
+          </p:nvPr>
+        </p:nvSpPr>
+        <p:spPr>
+          <a:xfrm>
+            <a:off x="269240" y="-899665"/>
+            <a:ext cx="11655840" cy="899665"/>
+          </a:xfrm>
+        </p:spPr>
+        <p:txBody>
+          <a:bodyPr vert="horz" wrap="square" lIns="146304" tIns="91440" rIns="146304" bIns="91440" rtlCol="0" anchor="b">
+            <a:noAutofit/>
+          </a:bodyPr>
+          <a:lstStyle/>
+          <a:p>
+            <a:r>
+              <a:rPr lang="en-US" dirty="0"/>
+              <a:t>End</a:t>
+            </a:r>
+          </a:p>
+        </p:txBody>
+      </p:sp>
     </p:spTree>
     <p:extLst>
       <p:ext uri="{BB962C8B-B14F-4D97-AF65-F5344CB8AC3E}">
@@ -29369,7 +29404,7 @@
                 </a:solidFill>
                 <a:cs typeface="Segoe UI" panose="020B0502040204020203" pitchFamily="34" charset="0"/>
               </a:rPr>
-              <a:t>Customer situation</a:t>
+              <a:t>Customer situation - 1</a:t>
             </a:r>
             <a:br>
               <a:rPr lang="en-US" dirty="0">
@@ -29550,7 +29585,7 @@
                 </a:solidFill>
                 <a:cs typeface="Segoe UI" panose="020B0502040204020203" pitchFamily="34" charset="0"/>
               </a:rPr>
-              <a:t>Customer situation</a:t>
+              <a:t>Customer situation - 2</a:t>
             </a:r>
             <a:br>
               <a:rPr lang="en-US" dirty="0">
@@ -30001,7 +30036,7 @@
         <p:spPr/>
         <p:txBody>
           <a:bodyPr>
-            <a:normAutofit fontScale="90000"/>
+            <a:normAutofit/>
           </a:bodyPr>
           <a:lstStyle/>
           <a:p>
@@ -30012,16 +30047,8 @@
                 </a:solidFill>
                 <a:cs typeface="Segoe UI" panose="020B0502040204020203" pitchFamily="34" charset="0"/>
               </a:rPr>
-              <a:t>Customer situation</a:t>
-            </a:r>
-            <a:br>
-              <a:rPr lang="en-US" dirty="0">
-                <a:solidFill>
-                  <a:schemeClr val="tx1"/>
-                </a:solidFill>
-                <a:latin typeface="Segoe UI" panose="020B0502040204020203" pitchFamily="34" charset="0"/>
-              </a:rPr>
-            </a:br>
+              <a:t>Customer situation - 3</a:t>
+            </a:r>
             <a:endParaRPr lang="en-US" sz="3236" dirty="0">
               <a:solidFill>
                 <a:schemeClr val="tx1"/>
@@ -32078,6 +32105,12 @@
 </file>
 
 <file path=customXml/item1.xml><?xml version="1.0" encoding="utf-8"?>
+<p:properties xmlns:p="http://schemas.microsoft.com/office/2006/metadata/properties" xmlns:xsi="http://www.w3.org/2001/XMLSchema-instance" xmlns:pc="http://schemas.microsoft.com/office/infopath/2007/PartnerControls">
+  <documentManagement/>
+</p:properties>
+</file>
+
+<file path=customXml/item2.xml><?xml version="1.0" encoding="utf-8"?>
 <ct:contentTypeSchema xmlns:ct="http://schemas.microsoft.com/office/2006/metadata/contentType" xmlns:ma="http://schemas.microsoft.com/office/2006/metadata/properties/metaAttributes" ct:_="" ma:_="" ma:contentTypeName="Document" ma:contentTypeID="0x010100BCA4EC527BF874469D7E5FECF7D9FB70" ma:contentTypeVersion="6" ma:contentTypeDescription="Create a new document." ma:contentTypeScope="" ma:versionID="63bcfb01198a5f4cc35071d76a13e973">
   <xsd:schema xmlns:xsd="http://www.w3.org/2001/XMLSchema" xmlns:xs="http://www.w3.org/2001/XMLSchema" xmlns:p="http://schemas.microsoft.com/office/2006/metadata/properties" xmlns:ns2="25b059c1-e0b1-4aae-b8e7-a9c1a20f7312" xmlns:ns3="24937d34-002f-4836-b77c-e21f12df0152" targetNamespace="http://schemas.microsoft.com/office/2006/metadata/properties" ma:root="true" ma:fieldsID="12b927a22a17d3f79cc59c0932bea1cb" ns2:_="" ns3:_="">
     <xsd:import namespace="25b059c1-e0b1-4aae-b8e7-a9c1a20f7312"/>
@@ -32256,12 +32289,6 @@
 </ct:contentTypeSchema>
 </file>
 
-<file path=customXml/item2.xml><?xml version="1.0" encoding="utf-8"?>
-<p:properties xmlns:p="http://schemas.microsoft.com/office/2006/metadata/properties" xmlns:xsi="http://www.w3.org/2001/XMLSchema-instance" xmlns:pc="http://schemas.microsoft.com/office/infopath/2007/PartnerControls">
-  <documentManagement/>
-</p:properties>
-</file>
-
 <file path=customXml/item3.xml><?xml version="1.0" encoding="utf-8"?>
 <?mso-contentType ?>
 <FormTemplates xmlns="http://schemas.microsoft.com/sharepoint/v3/contenttype/forms">
@@ -32272,6 +32299,23 @@
 </file>
 
 <file path=customXml/itemProps1.xml><?xml version="1.0" encoding="utf-8"?>
+<ds:datastoreItem xmlns:ds="http://schemas.openxmlformats.org/officeDocument/2006/customXml" ds:itemID="{2AC6E67E-42B4-40AF-80F4-D98253E4E21A}">
+  <ds:schemaRefs>
+    <ds:schemaRef ds:uri="24937d34-002f-4836-b77c-e21f12df0152"/>
+    <ds:schemaRef ds:uri="http://schemas.microsoft.com/office/2006/metadata/properties"/>
+    <ds:schemaRef ds:uri="25b059c1-e0b1-4aae-b8e7-a9c1a20f7312"/>
+    <ds:schemaRef ds:uri="http://schemas.microsoft.com/office/2006/documentManagement/types"/>
+    <ds:schemaRef ds:uri="http://www.w3.org/XML/1998/namespace"/>
+    <ds:schemaRef ds:uri="http://purl.org/dc/terms/"/>
+    <ds:schemaRef ds:uri="http://schemas.microsoft.com/office/infopath/2007/PartnerControls"/>
+    <ds:schemaRef ds:uri="http://schemas.openxmlformats.org/package/2006/metadata/core-properties"/>
+    <ds:schemaRef ds:uri="http://purl.org/dc/dcmitype/"/>
+    <ds:schemaRef ds:uri="http://purl.org/dc/elements/1.1/"/>
+  </ds:schemaRefs>
+</ds:datastoreItem>
+</file>
+
+<file path=customXml/itemProps2.xml><?xml version="1.0" encoding="utf-8"?>
 <ds:datastoreItem xmlns:ds="http://schemas.openxmlformats.org/officeDocument/2006/customXml" ds:itemID="{50B43756-F2F7-4341-9ED7-6CDCB2E9AC83}">
   <ds:schemaRefs>
     <ds:schemaRef ds:uri="http://schemas.microsoft.com/office/2006/metadata/contentType"/>
@@ -32290,23 +32334,6 @@
 </ds:datastoreItem>
 </file>
 
-<file path=customXml/itemProps2.xml><?xml version="1.0" encoding="utf-8"?>
-<ds:datastoreItem xmlns:ds="http://schemas.openxmlformats.org/officeDocument/2006/customXml" ds:itemID="{2AC6E67E-42B4-40AF-80F4-D98253E4E21A}">
-  <ds:schemaRefs>
-    <ds:schemaRef ds:uri="24937d34-002f-4836-b77c-e21f12df0152"/>
-    <ds:schemaRef ds:uri="http://schemas.microsoft.com/office/2006/metadata/properties"/>
-    <ds:schemaRef ds:uri="25b059c1-e0b1-4aae-b8e7-a9c1a20f7312"/>
-    <ds:schemaRef ds:uri="http://schemas.microsoft.com/office/2006/documentManagement/types"/>
-    <ds:schemaRef ds:uri="http://www.w3.org/XML/1998/namespace"/>
-    <ds:schemaRef ds:uri="http://purl.org/dc/terms/"/>
-    <ds:schemaRef ds:uri="http://schemas.microsoft.com/office/infopath/2007/PartnerControls"/>
-    <ds:schemaRef ds:uri="http://schemas.openxmlformats.org/package/2006/metadata/core-properties"/>
-    <ds:schemaRef ds:uri="http://purl.org/dc/dcmitype/"/>
-    <ds:schemaRef ds:uri="http://purl.org/dc/elements/1.1/"/>
-  </ds:schemaRefs>
-</ds:datastoreItem>
-</file>
-
 <file path=customXml/itemProps3.xml><?xml version="1.0" encoding="utf-8"?>
 <ds:datastoreItem xmlns:ds="http://schemas.openxmlformats.org/officeDocument/2006/customXml" ds:itemID="{FC7B288A-115F-4EDF-8326-05039CEE1DB1}">
   <ds:schemaRefs>

</xml_diff>